<commit_message>
Alterações no ppt e canvas
</commit_message>
<xml_diff>
--- a/documentacao/apresentacao/totem_Monitoring.pptx
+++ b/documentacao/apresentacao/totem_Monitoring.pptx
@@ -5,7 +5,7 @@
     <p:sldMasterId id="2147483648" r:id="rId4"/>
   </p:sldMasterIdLst>
   <p:notesMasterIdLst>
-    <p:notesMasterId r:id="rId13"/>
+    <p:notesMasterId r:id="rId14"/>
   </p:notesMasterIdLst>
   <p:sldIdLst>
     <p:sldId id="256" r:id="rId5"/>
@@ -13,9 +13,10 @@
     <p:sldId id="279" r:id="rId7"/>
     <p:sldId id="277" r:id="rId8"/>
     <p:sldId id="280" r:id="rId9"/>
-    <p:sldId id="282" r:id="rId10"/>
-    <p:sldId id="283" r:id="rId11"/>
-    <p:sldId id="284" r:id="rId12"/>
+    <p:sldId id="285" r:id="rId10"/>
+    <p:sldId id="282" r:id="rId11"/>
+    <p:sldId id="283" r:id="rId12"/>
+    <p:sldId id="284" r:id="rId13"/>
   </p:sldIdLst>
   <p:sldSz cx="12192000" cy="6858000"/>
   <p:notesSz cx="6858000" cy="9144000"/>
@@ -21261,13 +21262,8 @@
             </a:pPr>
             <a:r>
               <a:rPr lang="en-US" sz="2000" dirty="0"/>
-              <a:t> Felipe </a:t>
+              <a:t> Felipe Sueto</a:t>
             </a:r>
-            <a:r>
-              <a:rPr lang="en-US" sz="2000" dirty="0" err="1"/>
-              <a:t>Sueto</a:t>
-            </a:r>
-            <a:endParaRPr lang="en-US" sz="2000" dirty="0"/>
           </a:p>
           <a:p>
             <a:pPr algn="ctr">
@@ -21347,13 +21343,7 @@
         </p:nvPicPr>
         <p:blipFill>
           <a:blip r:embed="rId3">
-            <a:duotone>
-              <a:schemeClr val="accent1">
-                <a:shade val="45000"/>
-                <a:satMod val="135000"/>
-              </a:schemeClr>
-              <a:prstClr val="white"/>
-            </a:duotone>
+            <a:grayscl/>
             <a:extLst>
               <a:ext uri="{BEBA8EAE-BF5A-486C-A8C5-ECC9F3942E4B}">
                 <a14:imgProps xmlns:a14="http://schemas.microsoft.com/office/drawing/2010/main">
@@ -21396,13 +21386,7 @@
         </p:nvPicPr>
         <p:blipFill>
           <a:blip r:embed="rId3">
-            <a:duotone>
-              <a:schemeClr val="accent1">
-                <a:shade val="45000"/>
-                <a:satMod val="135000"/>
-              </a:schemeClr>
-              <a:prstClr val="white"/>
-            </a:duotone>
+            <a:grayscl/>
             <a:extLst>
               <a:ext uri="{BEBA8EAE-BF5A-486C-A8C5-ECC9F3942E4B}">
                 <a14:imgProps xmlns:a14="http://schemas.microsoft.com/office/drawing/2010/main">
@@ -21686,36 +21670,6 @@
           <a:chExt cx="0" cy="0"/>
         </a:xfrm>
       </p:grpSpPr>
-      <p:pic>
-        <p:nvPicPr>
-          <p:cNvPr id="6" name="Content Placeholder 6">
-            <a:extLst>
-              <a:ext uri="{FF2B5EF4-FFF2-40B4-BE49-F238E27FC236}">
-                <a16:creationId xmlns:a16="http://schemas.microsoft.com/office/drawing/2014/main" id="{65AC39BD-B262-4D99-9C2E-999CB35648C5}"/>
-              </a:ext>
-            </a:extLst>
-          </p:cNvPr>
-          <p:cNvPicPr>
-            <a:picLocks noChangeAspect="1"/>
-          </p:cNvPicPr>
-          <p:nvPr/>
-        </p:nvPicPr>
-        <p:blipFill>
-          <a:blip r:embed="rId2"/>
-          <a:stretch>
-            <a:fillRect/>
-          </a:stretch>
-        </p:blipFill>
-        <p:spPr>
-          <a:xfrm>
-            <a:off x="1248750" y="956603"/>
-            <a:ext cx="10025335" cy="5550214"/>
-          </a:xfrm>
-          <a:prstGeom prst="rect">
-            <a:avLst/>
-          </a:prstGeom>
-        </p:spPr>
-      </p:pic>
       <p:sp>
         <p:nvSpPr>
           <p:cNvPr id="2" name="Title 1">
@@ -21734,7 +21688,7 @@
         </p:nvSpPr>
         <p:spPr>
           <a:xfrm>
-            <a:off x="1024128" y="0"/>
+            <a:off x="472633" y="75468"/>
             <a:ext cx="9720072" cy="956603"/>
           </a:xfrm>
         </p:spPr>
@@ -21752,132 +21706,6 @@
           </a:p>
         </p:txBody>
       </p:sp>
-      <p:pic>
-        <p:nvPicPr>
-          <p:cNvPr id="8" name="Picture 7">
-            <a:extLst>
-              <a:ext uri="{FF2B5EF4-FFF2-40B4-BE49-F238E27FC236}">
-                <a16:creationId xmlns:a16="http://schemas.microsoft.com/office/drawing/2014/main" id="{8F918C20-35BD-4EB2-996D-E87B4D1FFE03}"/>
-              </a:ext>
-            </a:extLst>
-          </p:cNvPr>
-          <p:cNvPicPr>
-            <a:picLocks noChangeAspect="1"/>
-          </p:cNvPicPr>
-          <p:nvPr/>
-        </p:nvPicPr>
-        <p:blipFill>
-          <a:blip r:embed="rId3">
-            <a:extLst>
-              <a:ext uri="{BEBA8EAE-BF5A-486C-A8C5-ECC9F3942E4B}">
-                <a14:imgProps xmlns:a14="http://schemas.microsoft.com/office/drawing/2010/main">
-                  <a14:imgLayer r:embed="rId4">
-                    <a14:imgEffect>
-                      <a14:brightnessContrast bright="-40000" contrast="40000"/>
-                    </a14:imgEffect>
-                  </a14:imgLayer>
-                </a14:imgProps>
-              </a:ext>
-            </a:extLst>
-          </a:blip>
-          <a:stretch>
-            <a:fillRect/>
-          </a:stretch>
-        </p:blipFill>
-        <p:spPr>
-          <a:xfrm flipH="1">
-            <a:off x="1248750" y="6052333"/>
-            <a:ext cx="805667" cy="805667"/>
-          </a:xfrm>
-          <a:prstGeom prst="rect">
-            <a:avLst/>
-          </a:prstGeom>
-        </p:spPr>
-      </p:pic>
-      <p:pic>
-        <p:nvPicPr>
-          <p:cNvPr id="10" name="Picture 9">
-            <a:extLst>
-              <a:ext uri="{FF2B5EF4-FFF2-40B4-BE49-F238E27FC236}">
-                <a16:creationId xmlns:a16="http://schemas.microsoft.com/office/drawing/2014/main" id="{B144420A-4307-4470-8E39-B01671164A9E}"/>
-              </a:ext>
-            </a:extLst>
-          </p:cNvPr>
-          <p:cNvPicPr>
-            <a:picLocks noChangeAspect="1"/>
-          </p:cNvPicPr>
-          <p:nvPr/>
-        </p:nvPicPr>
-        <p:blipFill>
-          <a:blip r:embed="rId3">
-            <a:extLst>
-              <a:ext uri="{BEBA8EAE-BF5A-486C-A8C5-ECC9F3942E4B}">
-                <a14:imgProps xmlns:a14="http://schemas.microsoft.com/office/drawing/2010/main">
-                  <a14:imgLayer r:embed="rId4">
-                    <a14:imgEffect>
-                      <a14:brightnessContrast bright="-40000" contrast="40000"/>
-                    </a14:imgEffect>
-                  </a14:imgLayer>
-                </a14:imgProps>
-              </a:ext>
-            </a:extLst>
-          </a:blip>
-          <a:stretch>
-            <a:fillRect/>
-          </a:stretch>
-        </p:blipFill>
-        <p:spPr>
-          <a:xfrm rot="2576783">
-            <a:off x="10606308" y="721911"/>
-            <a:ext cx="805667" cy="805667"/>
-          </a:xfrm>
-          <a:prstGeom prst="rect">
-            <a:avLst/>
-          </a:prstGeom>
-        </p:spPr>
-      </p:pic>
-      <p:pic>
-        <p:nvPicPr>
-          <p:cNvPr id="11" name="Picture 10">
-            <a:extLst>
-              <a:ext uri="{FF2B5EF4-FFF2-40B4-BE49-F238E27FC236}">
-                <a16:creationId xmlns:a16="http://schemas.microsoft.com/office/drawing/2014/main" id="{E65EF741-EDF0-415E-962B-04DAE2F83DE7}"/>
-              </a:ext>
-            </a:extLst>
-          </p:cNvPr>
-          <p:cNvPicPr>
-            <a:picLocks noChangeAspect="1"/>
-          </p:cNvPicPr>
-          <p:nvPr/>
-        </p:nvPicPr>
-        <p:blipFill>
-          <a:blip r:embed="rId3">
-            <a:extLst>
-              <a:ext uri="{BEBA8EAE-BF5A-486C-A8C5-ECC9F3942E4B}">
-                <a14:imgProps xmlns:a14="http://schemas.microsoft.com/office/drawing/2010/main">
-                  <a14:imgLayer r:embed="rId4">
-                    <a14:imgEffect>
-                      <a14:brightnessContrast bright="-40000" contrast="40000"/>
-                    </a14:imgEffect>
-                  </a14:imgLayer>
-                </a14:imgProps>
-              </a:ext>
-            </a:extLst>
-          </a:blip>
-          <a:stretch>
-            <a:fillRect/>
-          </a:stretch>
-        </p:blipFill>
-        <p:spPr>
-          <a:xfrm rot="19133673" flipH="1">
-            <a:off x="1083208" y="770963"/>
-            <a:ext cx="805667" cy="805667"/>
-          </a:xfrm>
-          <a:prstGeom prst="rect">
-            <a:avLst/>
-          </a:prstGeom>
-        </p:spPr>
-      </p:pic>
       <p:sp>
         <p:nvSpPr>
           <p:cNvPr id="4" name="Rectangle 3">
@@ -21947,11 +21775,11 @@
           <p:nvPr/>
         </p:nvPicPr>
         <p:blipFill>
-          <a:blip r:embed="rId3">
+          <a:blip r:embed="rId2">
             <a:extLst>
               <a:ext uri="{BEBA8EAE-BF5A-486C-A8C5-ECC9F3942E4B}">
                 <a14:imgProps xmlns:a14="http://schemas.microsoft.com/office/drawing/2010/main">
-                  <a14:imgLayer r:embed="rId4">
+                  <a14:imgLayer r:embed="rId3">
                     <a14:imgEffect>
                       <a14:brightnessContrast bright="-40000" contrast="40000"/>
                     </a14:imgEffect>
@@ -21966,8 +21794,38 @@
         </p:blipFill>
         <p:spPr>
           <a:xfrm>
-            <a:off x="10620818" y="6053797"/>
+            <a:off x="11244535" y="6103983"/>
             <a:ext cx="805667" cy="805667"/>
+          </a:xfrm>
+          <a:prstGeom prst="rect">
+            <a:avLst/>
+          </a:prstGeom>
+        </p:spPr>
+      </p:pic>
+      <p:pic>
+        <p:nvPicPr>
+          <p:cNvPr id="5" name="Imagem 4">
+            <a:extLst>
+              <a:ext uri="{FF2B5EF4-FFF2-40B4-BE49-F238E27FC236}">
+                <a16:creationId xmlns:a16="http://schemas.microsoft.com/office/drawing/2014/main" id="{B1853DD6-0877-4540-AF65-E667186EBE58}"/>
+              </a:ext>
+            </a:extLst>
+          </p:cNvPr>
+          <p:cNvPicPr>
+            <a:picLocks noChangeAspect="1"/>
+          </p:cNvPicPr>
+          <p:nvPr/>
+        </p:nvPicPr>
+        <p:blipFill>
+          <a:blip r:embed="rId4"/>
+          <a:stretch>
+            <a:fillRect/>
+          </a:stretch>
+        </p:blipFill>
+        <p:spPr>
+          <a:xfrm>
+            <a:off x="1719384" y="801858"/>
+            <a:ext cx="8753231" cy="5627077"/>
           </a:xfrm>
           <a:prstGeom prst="rect">
             <a:avLst/>
@@ -22249,7 +22107,32 @@
                   </a:outerShdw>
                 </a:effectLst>
               </a:rPr>
-              <a:t>Eu como desenvolvedor, gostaria de um site Institucional para atigir um maior público. </a:t>
+              <a:t> C</a:t>
+            </a:r>
+            <a:r>
+              <a:rPr lang="pt-BR" sz="2000" dirty="0">
+                <a:ln w="0"/>
+                <a:solidFill>
+                  <a:schemeClr val="tx1"/>
+                </a:solidFill>
+              </a:rPr>
+              <a:t>omo</a:t>
+            </a:r>
+            <a:r>
+              <a:rPr lang="pt-BR" sz="2000" dirty="0">
+                <a:ln w="0"/>
+                <a:solidFill>
+                  <a:schemeClr val="tx1"/>
+                </a:solidFill>
+                <a:effectLst>
+                  <a:outerShdw blurRad="38100" dist="19050" dir="2700000" algn="tl" rotWithShape="0">
+                    <a:schemeClr val="dk1">
+                      <a:alpha val="40000"/>
+                    </a:schemeClr>
+                  </a:outerShdw>
+                </a:effectLst>
+              </a:rPr>
+              <a:t> desenvolvedor, gostaria de um site Institucional para atingir um maior público. </a:t>
             </a:r>
           </a:p>
         </p:txBody>
@@ -22666,6 +22549,198 @@
 </file>
 
 <file path=ppt/slides/slide6.xml><?xml version="1.0" encoding="utf-8"?>
+<p:sld xmlns:a="http://schemas.openxmlformats.org/drawingml/2006/main" xmlns:r="http://schemas.openxmlformats.org/officeDocument/2006/relationships" xmlns:p="http://schemas.openxmlformats.org/presentationml/2006/main">
+  <p:cSld>
+    <p:bg>
+      <p:bgPr>
+        <a:solidFill>
+          <a:schemeClr val="bg1"/>
+        </a:solidFill>
+        <a:effectLst/>
+      </p:bgPr>
+    </p:bg>
+    <p:spTree>
+      <p:nvGrpSpPr>
+        <p:cNvPr id="1" name=""/>
+        <p:cNvGrpSpPr/>
+        <p:nvPr/>
+      </p:nvGrpSpPr>
+      <p:grpSpPr>
+        <a:xfrm>
+          <a:off x="0" y="0"/>
+          <a:ext cx="0" cy="0"/>
+          <a:chOff x="0" y="0"/>
+          <a:chExt cx="0" cy="0"/>
+        </a:xfrm>
+      </p:grpSpPr>
+      <p:sp>
+        <p:nvSpPr>
+          <p:cNvPr id="15" name="Rectangle 10">
+            <a:extLst>
+              <a:ext uri="{FF2B5EF4-FFF2-40B4-BE49-F238E27FC236}">
+                <a16:creationId xmlns:a16="http://schemas.microsoft.com/office/drawing/2014/main" id="{CA4D39DB-AFA4-47BA-A7F2-13A71D210C66}"/>
+              </a:ext>
+              <a:ext uri="{C183D7F6-B498-43B3-948B-1728B52AA6E4}">
+                <adec:decorative xmlns:adec="http://schemas.microsoft.com/office/drawing/2017/decorative" val="1"/>
+              </a:ext>
+            </a:extLst>
+          </p:cNvPr>
+          <p:cNvSpPr>
+            <a:spLocks noGrp="1" noRot="1" noChangeAspect="1" noMove="1" noResize="1" noEditPoints="1" noAdjustHandles="1" noChangeArrowheads="1" noChangeShapeType="1" noTextEdit="1"/>
+          </p:cNvSpPr>
+          <p:nvPr>
+            <p:extLst>
+              <p:ext uri="{386F3935-93C4-4BCD-93E2-E3B085C9AB24}">
+                <p16:designElem xmlns:p16="http://schemas.microsoft.com/office/powerpoint/2015/main" val="1"/>
+              </p:ext>
+            </p:extLst>
+          </p:nvPr>
+        </p:nvSpPr>
+        <p:spPr>
+          <a:xfrm>
+            <a:off x="7534656" y="-2"/>
+            <a:ext cx="4657344" cy="6858002"/>
+          </a:xfrm>
+          <a:prstGeom prst="rect">
+            <a:avLst/>
+          </a:prstGeom>
+          <a:solidFill>
+            <a:schemeClr val="accent1"/>
+          </a:solidFill>
+          <a:ln>
+            <a:noFill/>
+          </a:ln>
+        </p:spPr>
+        <p:style>
+          <a:lnRef idx="2">
+            <a:schemeClr val="accent1">
+              <a:shade val="50000"/>
+            </a:schemeClr>
+          </a:lnRef>
+          <a:fillRef idx="1">
+            <a:schemeClr val="accent1"/>
+          </a:fillRef>
+          <a:effectRef idx="0">
+            <a:schemeClr val="accent1"/>
+          </a:effectRef>
+          <a:fontRef idx="minor">
+            <a:schemeClr val="lt1"/>
+          </a:fontRef>
+        </p:style>
+        <p:txBody>
+          <a:bodyPr rtlCol="0" anchor="ctr"/>
+          <a:lstStyle/>
+          <a:p>
+            <a:pPr algn="ctr"/>
+            <a:endParaRPr lang="en-US"/>
+          </a:p>
+        </p:txBody>
+      </p:sp>
+      <p:sp>
+        <p:nvSpPr>
+          <p:cNvPr id="16" name="Content Placeholder 7">
+            <a:extLst>
+              <a:ext uri="{FF2B5EF4-FFF2-40B4-BE49-F238E27FC236}">
+                <a16:creationId xmlns:a16="http://schemas.microsoft.com/office/drawing/2014/main" id="{7D88CD5E-E83C-4310-9141-32EFAB4E2CC5}"/>
+              </a:ext>
+            </a:extLst>
+          </p:cNvPr>
+          <p:cNvSpPr>
+            <a:spLocks noGrp="1"/>
+          </p:cNvSpPr>
+          <p:nvPr>
+            <p:ph idx="1"/>
+          </p:nvPr>
+        </p:nvSpPr>
+        <p:spPr>
+          <a:xfrm>
+            <a:off x="8021490" y="585216"/>
+            <a:ext cx="3527043" cy="5586984"/>
+          </a:xfrm>
+        </p:spPr>
+        <p:txBody>
+          <a:bodyPr anchor="ctr">
+            <a:normAutofit/>
+          </a:bodyPr>
+          <a:lstStyle/>
+          <a:p>
+            <a:r>
+              <a:rPr lang="pt-BR" sz="5400" dirty="0">
+                <a:solidFill>
+                  <a:schemeClr val="bg1"/>
+                </a:solidFill>
+              </a:rPr>
+              <a:t>Storyboard</a:t>
+            </a:r>
+            <a:endParaRPr lang="en-US" sz="5400" dirty="0">
+              <a:solidFill>
+                <a:schemeClr val="bg1"/>
+              </a:solidFill>
+            </a:endParaRPr>
+          </a:p>
+        </p:txBody>
+      </p:sp>
+      <p:pic>
+        <p:nvPicPr>
+          <p:cNvPr id="1026" name="Picture 2" descr="Resultado de imagem para bonecos palito">
+            <a:extLst>
+              <a:ext uri="{FF2B5EF4-FFF2-40B4-BE49-F238E27FC236}">
+                <a16:creationId xmlns:a16="http://schemas.microsoft.com/office/drawing/2014/main" id="{27A2EE94-1495-419E-9269-7E0DC6AD30C1}"/>
+              </a:ext>
+            </a:extLst>
+          </p:cNvPr>
+          <p:cNvPicPr>
+            <a:picLocks noChangeAspect="1" noChangeArrowheads="1"/>
+          </p:cNvPicPr>
+          <p:nvPr/>
+        </p:nvPicPr>
+        <p:blipFill>
+          <a:blip r:embed="rId2">
+            <a:extLst>
+              <a:ext uri="{28A0092B-C50C-407E-A947-70E740481C1C}">
+                <a14:useLocalDpi xmlns:a14="http://schemas.microsoft.com/office/drawing/2010/main" val="0"/>
+              </a:ext>
+            </a:extLst>
+          </a:blip>
+          <a:srcRect/>
+          <a:stretch>
+            <a:fillRect/>
+          </a:stretch>
+        </p:blipFill>
+        <p:spPr bwMode="auto">
+          <a:xfrm>
+            <a:off x="519671" y="2348250"/>
+            <a:ext cx="6386732" cy="1820446"/>
+          </a:xfrm>
+          <a:prstGeom prst="rect">
+            <a:avLst/>
+          </a:prstGeom>
+          <a:noFill/>
+          <a:extLst>
+            <a:ext uri="{909E8E84-426E-40DD-AFC4-6F175D3DCCD1}">
+              <a14:hiddenFill xmlns:a14="http://schemas.microsoft.com/office/drawing/2010/main">
+                <a:solidFill>
+                  <a:srgbClr val="FFFFFF"/>
+                </a:solidFill>
+              </a14:hiddenFill>
+            </a:ext>
+          </a:extLst>
+        </p:spPr>
+      </p:pic>
+    </p:spTree>
+    <p:extLst>
+      <p:ext uri="{BB962C8B-B14F-4D97-AF65-F5344CB8AC3E}">
+        <p14:creationId xmlns:p14="http://schemas.microsoft.com/office/powerpoint/2010/main" val="2682939320"/>
+      </p:ext>
+    </p:extLst>
+  </p:cSld>
+  <p:clrMapOvr>
+    <a:masterClrMapping/>
+  </p:clrMapOvr>
+</p:sld>
+</file>
+
+<file path=ppt/slides/slide7.xml><?xml version="1.0" encoding="utf-8"?>
 <p:sld xmlns:a="http://schemas.openxmlformats.org/drawingml/2006/main" xmlns:r="http://schemas.openxmlformats.org/officeDocument/2006/relationships" xmlns:p="http://schemas.openxmlformats.org/presentationml/2006/main">
   <p:cSld>
     <p:spTree>
@@ -23414,7 +23489,7 @@
 </p:sld>
 </file>
 
-<file path=ppt/slides/slide7.xml><?xml version="1.0" encoding="utf-8"?>
+<file path=ppt/slides/slide8.xml><?xml version="1.0" encoding="utf-8"?>
 <p:sld xmlns:a="http://schemas.openxmlformats.org/drawingml/2006/main" xmlns:r="http://schemas.openxmlformats.org/officeDocument/2006/relationships" xmlns:p="http://schemas.openxmlformats.org/presentationml/2006/main">
   <p:cSld>
     <p:bg>
@@ -32432,7 +32507,7 @@
 </p:sld>
 </file>
 
-<file path=ppt/slides/slide8.xml><?xml version="1.0" encoding="utf-8"?>
+<file path=ppt/slides/slide9.xml><?xml version="1.0" encoding="utf-8"?>
 <p:sld xmlns:a="http://schemas.openxmlformats.org/drawingml/2006/main" xmlns:r="http://schemas.openxmlformats.org/officeDocument/2006/relationships" xmlns:p="http://schemas.openxmlformats.org/presentationml/2006/main">
   <p:cSld>
     <p:bg>
@@ -42080,12 +42155,11 @@
 </file>
 
 <file path=customXml/item1.xml><?xml version="1.0" encoding="utf-8"?>
-<?mso-contentType ?>
-<FormTemplates xmlns="http://schemas.microsoft.com/sharepoint/v3/contenttype/forms">
-  <Display>DocumentLibraryForm</Display>
-  <Edit>DocumentLibraryForm</Edit>
-  <New>DocumentLibraryForm</New>
-</FormTemplates>
+<p:properties xmlns:p="http://schemas.microsoft.com/office/2006/metadata/properties" xmlns:xsi="http://www.w3.org/2001/XMLSchema-instance" xmlns:pc="http://schemas.microsoft.com/office/infopath/2007/PartnerControls">
+  <documentManagement>
+    <MediaServiceKeyPoints xmlns="71af3243-3dd4-4a8d-8c0d-dd76da1f02a5" xsi:nil="true"/>
+  </documentManagement>
+</p:properties>
 </file>
 
 <file path=customXml/item2.xml><?xml version="1.0" encoding="utf-8"?>
@@ -42300,17 +42374,20 @@
 </file>
 
 <file path=customXml/item3.xml><?xml version="1.0" encoding="utf-8"?>
-<p:properties xmlns:p="http://schemas.microsoft.com/office/2006/metadata/properties" xmlns:xsi="http://www.w3.org/2001/XMLSchema-instance" xmlns:pc="http://schemas.microsoft.com/office/infopath/2007/PartnerControls">
-  <documentManagement>
-    <MediaServiceKeyPoints xmlns="71af3243-3dd4-4a8d-8c0d-dd76da1f02a5" xsi:nil="true"/>
-  </documentManagement>
-</p:properties>
+<?mso-contentType ?>
+<FormTemplates xmlns="http://schemas.microsoft.com/sharepoint/v3/contenttype/forms">
+  <Display>DocumentLibraryForm</Display>
+  <Edit>DocumentLibraryForm</Edit>
+  <New>DocumentLibraryForm</New>
+</FormTemplates>
 </file>
 
 <file path=customXml/itemProps1.xml><?xml version="1.0" encoding="utf-8"?>
-<ds:datastoreItem xmlns:ds="http://schemas.openxmlformats.org/officeDocument/2006/customXml" ds:itemID="{4F44C90D-2A62-4985-9618-3460247437B1}">
+<ds:datastoreItem xmlns:ds="http://schemas.openxmlformats.org/officeDocument/2006/customXml" ds:itemID="{788A2F88-55C5-4ED1-9541-807C65424763}">
   <ds:schemaRefs>
-    <ds:schemaRef ds:uri="http://schemas.microsoft.com/sharepoint/v3/contenttype/forms"/>
+    <ds:schemaRef ds:uri="http://schemas.microsoft.com/office/2006/metadata/properties"/>
+    <ds:schemaRef ds:uri="http://schemas.microsoft.com/office/infopath/2007/PartnerControls"/>
+    <ds:schemaRef ds:uri="71af3243-3dd4-4a8d-8c0d-dd76da1f02a5"/>
   </ds:schemaRefs>
 </ds:datastoreItem>
 </file>
@@ -42335,11 +42412,9 @@
 </file>
 
 <file path=customXml/itemProps3.xml><?xml version="1.0" encoding="utf-8"?>
-<ds:datastoreItem xmlns:ds="http://schemas.openxmlformats.org/officeDocument/2006/customXml" ds:itemID="{788A2F88-55C5-4ED1-9541-807C65424763}">
+<ds:datastoreItem xmlns:ds="http://schemas.openxmlformats.org/officeDocument/2006/customXml" ds:itemID="{4F44C90D-2A62-4985-9618-3460247437B1}">
   <ds:schemaRefs>
-    <ds:schemaRef ds:uri="http://schemas.microsoft.com/office/2006/metadata/properties"/>
-    <ds:schemaRef ds:uri="http://schemas.microsoft.com/office/infopath/2007/PartnerControls"/>
-    <ds:schemaRef ds:uri="71af3243-3dd4-4a8d-8c0d-dd76da1f02a5"/>
+    <ds:schemaRef ds:uri="http://schemas.microsoft.com/sharepoint/v3/contenttype/forms"/>
   </ds:schemaRefs>
 </ds:datastoreItem>
 </file>
</xml_diff>